<commit_message>
Nouveau fichier "index" avec le thème de l'accueil
</commit_message>
<xml_diff>
--- a/Livrables/Base de données/Hego Lagunak.pptx
+++ b/Livrables/Base de données/Hego Lagunak.pptx
@@ -5,18 +5,17 @@
     <p:sldMasterId id="2147483660" r:id="rId4"/>
   </p:sldMasterIdLst>
   <p:notesMasterIdLst>
-    <p:notesMasterId r:id="rId11"/>
+    <p:notesMasterId r:id="rId10"/>
   </p:notesMasterIdLst>
   <p:handoutMasterIdLst>
-    <p:handoutMasterId r:id="rId12"/>
+    <p:handoutMasterId r:id="rId11"/>
   </p:handoutMasterIdLst>
   <p:sldIdLst>
     <p:sldId id="278" r:id="rId5"/>
     <p:sldId id="279" r:id="rId6"/>
     <p:sldId id="280" r:id="rId7"/>
     <p:sldId id="281" r:id="rId8"/>
-    <p:sldId id="282" r:id="rId9"/>
-    <p:sldId id="283" r:id="rId10"/>
+    <p:sldId id="283" r:id="rId9"/>
   </p:sldIdLst>
   <p:sldSz cx="12192000" cy="6858000"/>
   <p:notesSz cx="6858000" cy="9144000"/>
@@ -124,6 +123,70 @@
     </p:ext>
   </p:extLst>
 </p:presentation>
+</file>
+
+<file path=ppt/revisionInfo.xml><?xml version="1.0" encoding="utf-8"?>
+<p1510:revInfo xmlns:a="http://schemas.openxmlformats.org/drawingml/2006/main" xmlns:r="http://schemas.openxmlformats.org/officeDocument/2006/relationships" xmlns:p1510="http://schemas.microsoft.com/office/powerpoint/2015/10/main">
+  <p1510:revLst>
+    <p1510:client id="{25BB7326-7C95-4FDE-B306-0996F63EE760}" v="7" dt="2022-10-04T07:17:14.879"/>
+  </p1510:revLst>
+</p1510:revInfo>
+</file>
+
+<file path=ppt/changesInfos/changesInfo1.xml><?xml version="1.0" encoding="utf-8"?>
+<pc:chgInfo xmlns:a="http://schemas.openxmlformats.org/drawingml/2006/main" xmlns:r="http://schemas.openxmlformats.org/officeDocument/2006/relationships" xmlns:ac="http://schemas.microsoft.com/office/drawing/2013/main/command" xmlns:pc="http://schemas.microsoft.com/office/powerpoint/2013/main/command">
+  <pc:docChgLst>
+    <pc:chgData name="Leho ERREZARRET" userId="dfe8255fd2c1448c" providerId="LiveId" clId="{25BB7326-7C95-4FDE-B306-0996F63EE760}"/>
+    <pc:docChg chg="delSld modSld">
+      <pc:chgData name="Leho ERREZARRET" userId="dfe8255fd2c1448c" providerId="LiveId" clId="{25BB7326-7C95-4FDE-B306-0996F63EE760}" dt="2022-10-04T07:23:32.849" v="7" actId="47"/>
+      <pc:docMkLst>
+        <pc:docMk/>
+      </pc:docMkLst>
+      <pc:sldChg chg="modTransition">
+        <pc:chgData name="Leho ERREZARRET" userId="dfe8255fd2c1448c" providerId="LiveId" clId="{25BB7326-7C95-4FDE-B306-0996F63EE760}" dt="2022-10-04T07:14:17.954" v="0"/>
+        <pc:sldMkLst>
+          <pc:docMk/>
+          <pc:sldMk cId="4167884232" sldId="278"/>
+        </pc:sldMkLst>
+      </pc:sldChg>
+      <pc:sldChg chg="modTransition">
+        <pc:chgData name="Leho ERREZARRET" userId="dfe8255fd2c1448c" providerId="LiveId" clId="{25BB7326-7C95-4FDE-B306-0996F63EE760}" dt="2022-10-04T07:14:21.594" v="1"/>
+        <pc:sldMkLst>
+          <pc:docMk/>
+          <pc:sldMk cId="3220235682" sldId="279"/>
+        </pc:sldMkLst>
+      </pc:sldChg>
+      <pc:sldChg chg="modTransition">
+        <pc:chgData name="Leho ERREZARRET" userId="dfe8255fd2c1448c" providerId="LiveId" clId="{25BB7326-7C95-4FDE-B306-0996F63EE760}" dt="2022-10-04T07:17:08.857" v="3"/>
+        <pc:sldMkLst>
+          <pc:docMk/>
+          <pc:sldMk cId="518437942" sldId="280"/>
+        </pc:sldMkLst>
+      </pc:sldChg>
+      <pc:sldChg chg="modTransition">
+        <pc:chgData name="Leho ERREZARRET" userId="dfe8255fd2c1448c" providerId="LiveId" clId="{25BB7326-7C95-4FDE-B306-0996F63EE760}" dt="2022-10-04T07:17:11.010" v="4"/>
+        <pc:sldMkLst>
+          <pc:docMk/>
+          <pc:sldMk cId="2993880237" sldId="281"/>
+        </pc:sldMkLst>
+      </pc:sldChg>
+      <pc:sldChg chg="del modTransition">
+        <pc:chgData name="Leho ERREZARRET" userId="dfe8255fd2c1448c" providerId="LiveId" clId="{25BB7326-7C95-4FDE-B306-0996F63EE760}" dt="2022-10-04T07:23:32.849" v="7" actId="47"/>
+        <pc:sldMkLst>
+          <pc:docMk/>
+          <pc:sldMk cId="3597811109" sldId="282"/>
+        </pc:sldMkLst>
+      </pc:sldChg>
+      <pc:sldChg chg="modTransition">
+        <pc:chgData name="Leho ERREZARRET" userId="dfe8255fd2c1448c" providerId="LiveId" clId="{25BB7326-7C95-4FDE-B306-0996F63EE760}" dt="2022-10-04T07:17:14.879" v="6"/>
+        <pc:sldMkLst>
+          <pc:docMk/>
+          <pc:sldMk cId="577549230" sldId="283"/>
+        </pc:sldMkLst>
+      </pc:sldChg>
+    </pc:docChg>
+  </pc:docChgLst>
+</pc:chgInfo>
 </file>
 
 <file path=ppt/handoutMasters/handoutMaster1.xml><?xml version="1.0" encoding="utf-8"?>
@@ -1280,7 +1343,7 @@
                 <a:tabLst/>
                 <a:defRPr/>
               </a:pPr>
-              <a:t>6</a:t>
+              <a:t>5</a:t>
             </a:fld>
             <a:endParaRPr kumimoji="0" lang="fr-FR" sz="1200" b="0" i="0" u="none" strike="noStrike" kern="1200" cap="none" spc="0" normalizeH="0" baseline="0" dirty="0">
               <a:ln>
@@ -7247,7 +7310,7 @@
           </a:effectLst>
           <a:extLst>
             <a:ext uri="{91240B29-F687-4f45-9708-019B960494DF}">
-              <a14:hiddenLine xmlns="" xmlns:a14="http://schemas.microsoft.com/office/drawing/2010/main" xmlns:a16="http://schemas.microsoft.com/office/drawing/2014/main" xmlns:p14="http://schemas.microsoft.com/office/powerpoint/2010/main" w="9525">
+              <a14:hiddenLine xmlns:p14="http://schemas.microsoft.com/office/powerpoint/2010/main" xmlns:a16="http://schemas.microsoft.com/office/drawing/2014/main" xmlns:a14="http://schemas.microsoft.com/office/drawing/2010/main" xmlns="" w="9525">
                 <a:solidFill>
                   <a:srgbClr val="000000"/>
                 </a:solidFill>
@@ -7418,6 +7481,9 @@
   <p:clrMapOvr>
     <a:masterClrMapping/>
   </p:clrMapOvr>
+  <p:transition spd="slow">
+    <p:push dir="u"/>
+  </p:transition>
 </p:sld>
 </file>
 
@@ -7731,6 +7797,9 @@
   <p:clrMapOvr>
     <a:masterClrMapping/>
   </p:clrMapOvr>
+  <p:transition spd="slow">
+    <p:push dir="u"/>
+  </p:transition>
   <p:timing>
     <p:tnLst>
       <p:par>
@@ -8325,6 +8394,9 @@
   <p:clrMapOvr>
     <a:masterClrMapping/>
   </p:clrMapOvr>
+  <p:transition spd="slow">
+    <p:push dir="u"/>
+  </p:transition>
   <p:timing>
     <p:tnLst>
       <p:par>
@@ -8926,6 +8998,9 @@
   <p:clrMapOvr>
     <a:masterClrMapping/>
   </p:clrMapOvr>
+  <p:transition spd="slow">
+    <p:push dir="u"/>
+  </p:transition>
   <p:timing>
     <p:tnLst>
       <p:par>
@@ -9270,89 +9345,6 @@
 <file path=ppt/slides/slide5.xml><?xml version="1.0" encoding="utf-8"?>
 <p:sld xmlns:a="http://schemas.openxmlformats.org/drawingml/2006/main" xmlns:r="http://schemas.openxmlformats.org/officeDocument/2006/relationships" xmlns:p="http://schemas.openxmlformats.org/presentationml/2006/main">
   <p:cSld>
-    <p:spTree>
-      <p:nvGrpSpPr>
-        <p:cNvPr id="1" name=""/>
-        <p:cNvGrpSpPr/>
-        <p:nvPr/>
-      </p:nvGrpSpPr>
-      <p:grpSpPr>
-        <a:xfrm>
-          <a:off x="0" y="0"/>
-          <a:ext cx="0" cy="0"/>
-          <a:chOff x="0" y="0"/>
-          <a:chExt cx="0" cy="0"/>
-        </a:xfrm>
-      </p:grpSpPr>
-      <p:sp>
-        <p:nvSpPr>
-          <p:cNvPr id="2" name="Titre 1">
-            <a:extLst>
-              <a:ext uri="{FF2B5EF4-FFF2-40B4-BE49-F238E27FC236}">
-                <a16:creationId xmlns:a16="http://schemas.microsoft.com/office/drawing/2014/main" id="{0C8E35F7-A9A1-C99F-F096-82B881C0A7C5}"/>
-              </a:ext>
-            </a:extLst>
-          </p:cNvPr>
-          <p:cNvSpPr>
-            <a:spLocks noGrp="1"/>
-          </p:cNvSpPr>
-          <p:nvPr>
-            <p:ph type="title"/>
-          </p:nvPr>
-        </p:nvSpPr>
-        <p:spPr/>
-        <p:txBody>
-          <a:bodyPr/>
-          <a:lstStyle/>
-          <a:p>
-            <a:r>
-              <a:rPr lang="fr-FR" dirty="0"/>
-              <a:t>Base de données</a:t>
-            </a:r>
-          </a:p>
-        </p:txBody>
-      </p:sp>
-      <p:sp>
-        <p:nvSpPr>
-          <p:cNvPr id="3" name="Espace réservé du contenu 2">
-            <a:extLst>
-              <a:ext uri="{FF2B5EF4-FFF2-40B4-BE49-F238E27FC236}">
-                <a16:creationId xmlns:a16="http://schemas.microsoft.com/office/drawing/2014/main" id="{896C40DB-98F7-8D87-448A-A13D536DAC0B}"/>
-              </a:ext>
-            </a:extLst>
-          </p:cNvPr>
-          <p:cNvSpPr>
-            <a:spLocks noGrp="1"/>
-          </p:cNvSpPr>
-          <p:nvPr>
-            <p:ph idx="1"/>
-          </p:nvPr>
-        </p:nvSpPr>
-        <p:spPr/>
-        <p:txBody>
-          <a:bodyPr/>
-          <a:lstStyle/>
-          <a:p>
-            <a:endParaRPr lang="fr-FR"/>
-          </a:p>
-        </p:txBody>
-      </p:sp>
-    </p:spTree>
-    <p:extLst>
-      <p:ext uri="{BB962C8B-B14F-4D97-AF65-F5344CB8AC3E}">
-        <p14:creationId xmlns:p14="http://schemas.microsoft.com/office/powerpoint/2010/main" val="3597811109"/>
-      </p:ext>
-    </p:extLst>
-  </p:cSld>
-  <p:clrMapOvr>
-    <a:masterClrMapping/>
-  </p:clrMapOvr>
-</p:sld>
-</file>
-
-<file path=ppt/slides/slide6.xml><?xml version="1.0" encoding="utf-8"?>
-<p:sld xmlns:a="http://schemas.openxmlformats.org/drawingml/2006/main" xmlns:r="http://schemas.openxmlformats.org/officeDocument/2006/relationships" xmlns:p="http://schemas.openxmlformats.org/presentationml/2006/main">
-  <p:cSld>
     <p:bg>
       <p:bgPr>
         <a:blipFill rotWithShape="1">
@@ -9809,6 +9801,9 @@
   <p:clrMapOvr>
     <a:masterClrMapping/>
   </p:clrMapOvr>
+  <p:transition spd="slow">
+    <p:push dir="u"/>
+  </p:transition>
   <p:timing>
     <p:tnLst>
       <p:par>
@@ -11218,15 +11213,6 @@
 </file>
 
 <file path=customXml/item1.xml><?xml version="1.0" encoding="utf-8"?>
-<?mso-contentType ?>
-<FormTemplates xmlns="http://schemas.microsoft.com/sharepoint/v3/contenttype/forms">
-  <Display>DocumentLibraryForm</Display>
-  <Edit>DocumentLibraryForm</Edit>
-  <New>DocumentLibraryForm</New>
-</FormTemplates>
-</file>
-
-<file path=customXml/item2.xml><?xml version="1.0" encoding="utf-8"?>
 <ct:contentTypeSchema xmlns:ct="http://schemas.microsoft.com/office/2006/metadata/contentType" xmlns:ma="http://schemas.microsoft.com/office/2006/metadata/properties/metaAttributes" ct:_="" ma:_="" ma:contentTypeName="Document" ma:contentTypeID="0x01010079F111ED35F8CC479449609E8A0923A6" ma:contentTypeVersion="12" ma:contentTypeDescription="Create a new document." ma:contentTypeScope="" ma:versionID="a410dd7f93c95333ffa1b60ed6adedd1">
   <xsd:schema xmlns:xsd="http://www.w3.org/2001/XMLSchema" xmlns:xs="http://www.w3.org/2001/XMLSchema" xmlns:p="http://schemas.microsoft.com/office/2006/metadata/properties" xmlns:ns2="71af3243-3dd4-4a8d-8c0d-dd76da1f02a5" xmlns:ns3="16c05727-aa75-4e4a-9b5f-8a80a1165891" targetNamespace="http://schemas.microsoft.com/office/2006/metadata/properties" ma:root="true" ma:fieldsID="a936d9baba76aa3866493feff160faab" ns2:_="" ns3:_="">
     <xsd:import namespace="71af3243-3dd4-4a8d-8c0d-dd76da1f02a5"/>
@@ -11447,6 +11433,15 @@
 </ct:contentTypeSchema>
 </file>
 
+<file path=customXml/item2.xml><?xml version="1.0" encoding="utf-8"?>
+<?mso-contentType ?>
+<FormTemplates xmlns="http://schemas.microsoft.com/sharepoint/v3/contenttype/forms">
+  <Display>DocumentLibraryForm</Display>
+  <Edit>DocumentLibraryForm</Edit>
+  <New>DocumentLibraryForm</New>
+</FormTemplates>
+</file>
+
 <file path=customXml/item3.xml><?xml version="1.0" encoding="utf-8"?>
 <p:properties xmlns:p="http://schemas.microsoft.com/office/2006/metadata/properties" xmlns:xsi="http://www.w3.org/2001/XMLSchema-instance" xmlns:pc="http://schemas.microsoft.com/office/infopath/2007/PartnerControls">
   <documentManagement>
@@ -11457,14 +11452,6 @@
 </file>
 
 <file path=customXml/itemProps1.xml><?xml version="1.0" encoding="utf-8"?>
-<ds:datastoreItem xmlns:ds="http://schemas.openxmlformats.org/officeDocument/2006/customXml" ds:itemID="{64B270AB-C138-415C-897E-3C24487DECF1}">
-  <ds:schemaRefs>
-    <ds:schemaRef ds:uri="http://schemas.microsoft.com/sharepoint/v3/contenttype/forms"/>
-  </ds:schemaRefs>
-</ds:datastoreItem>
-</file>
-
-<file path=customXml/itemProps2.xml><?xml version="1.0" encoding="utf-8"?>
 <ds:datastoreItem xmlns:ds="http://schemas.openxmlformats.org/officeDocument/2006/customXml" ds:itemID="{0585E981-8C91-4205-A0C3-C991F42B4C9E}">
   <ds:schemaRefs>
     <ds:schemaRef ds:uri="http://schemas.microsoft.com/office/2006/metadata/contentType"/>
@@ -11483,6 +11470,14 @@
 </ds:datastoreItem>
 </file>
 
+<file path=customXml/itemProps2.xml><?xml version="1.0" encoding="utf-8"?>
+<ds:datastoreItem xmlns:ds="http://schemas.openxmlformats.org/officeDocument/2006/customXml" ds:itemID="{64B270AB-C138-415C-897E-3C24487DECF1}">
+  <ds:schemaRefs>
+    <ds:schemaRef ds:uri="http://schemas.microsoft.com/sharepoint/v3/contenttype/forms"/>
+  </ds:schemaRefs>
+</ds:datastoreItem>
+</file>
+
 <file path=customXml/itemProps3.xml><?xml version="1.0" encoding="utf-8"?>
 <ds:datastoreItem xmlns:ds="http://schemas.openxmlformats.org/officeDocument/2006/customXml" ds:itemID="{2C4C00F4-06E9-43E3-AD97-88A857CEFA82}">
   <ds:schemaRefs>

</xml_diff>